<commit_message>
Update MODEL DEPLOYMENT ON FLASK.pptx
</commit_message>
<xml_diff>
--- a/MODEL DEPLOYMENT ON FLASK.pptx
+++ b/MODEL DEPLOYMENT ON FLASK.pptx
@@ -11,6 +11,7 @@
     <p:sldId id="259" r:id="rId5"/>
     <p:sldId id="261" r:id="rId6"/>
     <p:sldId id="260" r:id="rId7"/>
+    <p:sldId id="262" r:id="rId8"/>
   </p:sldIdLst>
   <p:sldSz cx="12192000" cy="6858000"/>
   <p:notesSz cx="6858000" cy="9144000"/>
@@ -109,6 +110,11 @@
       </a:defRPr>
     </a:lvl9pPr>
   </p:defaultTextStyle>
+  <p:extLst>
+    <p:ext uri="{EFAFB233-063F-42B5-8137-9DF3F51BA10A}">
+      <p15:sldGuideLst xmlns:p15="http://schemas.microsoft.com/office/powerpoint/2012/main"/>
+    </p:ext>
+  </p:extLst>
 </p:presentation>
 </file>
 
@@ -266,7 +272,7 @@
           <a:p>
             <a:fld id="{11EAACC7-3B3F-47D1-959A-EF58926E955E}" type="datetimeFigureOut">
               <a:rPr lang="en-US" smtClean="0"/>
-              <a:t>5/21/2024</a:t>
+              <a:t>5/23/2024</a:t>
             </a:fld>
             <a:endParaRPr lang="en-US"/>
           </a:p>
@@ -464,7 +470,7 @@
           <a:p>
             <a:fld id="{11EAACC7-3B3F-47D1-959A-EF58926E955E}" type="datetimeFigureOut">
               <a:rPr lang="en-US" smtClean="0"/>
-              <a:t>5/21/2024</a:t>
+              <a:t>5/23/2024</a:t>
             </a:fld>
             <a:endParaRPr lang="en-US"/>
           </a:p>
@@ -672,7 +678,7 @@
           <a:p>
             <a:fld id="{11EAACC7-3B3F-47D1-959A-EF58926E955E}" type="datetimeFigureOut">
               <a:rPr lang="en-US" smtClean="0"/>
-              <a:t>5/21/2024</a:t>
+              <a:t>5/23/2024</a:t>
             </a:fld>
             <a:endParaRPr lang="en-US"/>
           </a:p>
@@ -901,7 +907,7 @@
           <a:p>
             <a:fld id="{11EAACC7-3B3F-47D1-959A-EF58926E955E}" type="datetimeFigureOut">
               <a:rPr lang="en-US" smtClean="0"/>
-              <a:t>5/21/2024</a:t>
+              <a:t>5/23/2024</a:t>
             </a:fld>
             <a:endParaRPr lang="en-US" dirty="0"/>
           </a:p>
@@ -1176,7 +1182,7 @@
           <a:p>
             <a:fld id="{11EAACC7-3B3F-47D1-959A-EF58926E955E}" type="datetimeFigureOut">
               <a:rPr lang="en-US" smtClean="0"/>
-              <a:t>5/21/2024</a:t>
+              <a:t>5/23/2024</a:t>
             </a:fld>
             <a:endParaRPr lang="en-US"/>
           </a:p>
@@ -1442,7 +1448,7 @@
           <a:p>
             <a:fld id="{11EAACC7-3B3F-47D1-959A-EF58926E955E}" type="datetimeFigureOut">
               <a:rPr lang="en-US" smtClean="0"/>
-              <a:t>5/21/2024</a:t>
+              <a:t>5/23/2024</a:t>
             </a:fld>
             <a:endParaRPr lang="en-US"/>
           </a:p>
@@ -1859,7 +1865,7 @@
           <a:p>
             <a:fld id="{11EAACC7-3B3F-47D1-959A-EF58926E955E}" type="datetimeFigureOut">
               <a:rPr lang="en-US" smtClean="0"/>
-              <a:t>5/21/2024</a:t>
+              <a:t>5/23/2024</a:t>
             </a:fld>
             <a:endParaRPr lang="en-US"/>
           </a:p>
@@ -2000,7 +2006,7 @@
           <a:p>
             <a:fld id="{11EAACC7-3B3F-47D1-959A-EF58926E955E}" type="datetimeFigureOut">
               <a:rPr lang="en-US" smtClean="0"/>
-              <a:t>5/21/2024</a:t>
+              <a:t>5/23/2024</a:t>
             </a:fld>
             <a:endParaRPr lang="en-US"/>
           </a:p>
@@ -2113,7 +2119,7 @@
           <a:p>
             <a:fld id="{11EAACC7-3B3F-47D1-959A-EF58926E955E}" type="datetimeFigureOut">
               <a:rPr lang="en-US" smtClean="0"/>
-              <a:t>5/21/2024</a:t>
+              <a:t>5/23/2024</a:t>
             </a:fld>
             <a:endParaRPr lang="en-US"/>
           </a:p>
@@ -2424,7 +2430,7 @@
           <a:p>
             <a:fld id="{11EAACC7-3B3F-47D1-959A-EF58926E955E}" type="datetimeFigureOut">
               <a:rPr lang="en-US" smtClean="0"/>
-              <a:t>5/21/2024</a:t>
+              <a:t>5/23/2024</a:t>
             </a:fld>
             <a:endParaRPr lang="en-US"/>
           </a:p>
@@ -2715,7 +2721,7 @@
           <a:p>
             <a:fld id="{11EAACC7-3B3F-47D1-959A-EF58926E955E}" type="datetimeFigureOut">
               <a:rPr lang="en-US" smtClean="0"/>
-              <a:t>5/21/2024</a:t>
+              <a:t>5/23/2024</a:t>
             </a:fld>
             <a:endParaRPr lang="en-US"/>
           </a:p>
@@ -3272,7 +3278,7 @@
           <a:p>
             <a:fld id="{11EAACC7-3B3F-47D1-959A-EF58926E955E}" type="datetimeFigureOut">
               <a:rPr lang="en-US" smtClean="0"/>
-              <a:t>5/21/2024</a:t>
+              <a:t>5/23/2024</a:t>
             </a:fld>
             <a:endParaRPr lang="en-US"/>
           </a:p>
@@ -4456,15 +4462,7 @@
             </a:pPr>
             <a:r>
               <a:rPr lang="en-US" dirty="0"/>
-              <a:t>Mark </a:t>
-            </a:r>
-            <a:r>
-              <a:rPr lang="en-US" dirty="0" err="1"/>
-              <a:t>kimuati</a:t>
-            </a:r>
-            <a:r>
-              <a:rPr lang="en-US" dirty="0"/>
-              <a:t> kitur</a:t>
+              <a:t>Mark kimutai kitur</a:t>
             </a:r>
           </a:p>
           <a:p>
@@ -6477,6 +6475,140 @@
     <p:extLst>
       <p:ext uri="{BB962C8B-B14F-4D97-AF65-F5344CB8AC3E}">
         <p14:creationId xmlns:p14="http://schemas.microsoft.com/office/powerpoint/2010/main" val="3795055269"/>
+      </p:ext>
+    </p:extLst>
+  </p:cSld>
+  <p:clrMapOvr>
+    <a:masterClrMapping/>
+  </p:clrMapOvr>
+</p:sld>
+</file>
+
+<file path=ppt/slides/slide7.xml><?xml version="1.0" encoding="utf-8"?>
+<p:sld xmlns:a="http://schemas.openxmlformats.org/drawingml/2006/main" xmlns:r="http://schemas.openxmlformats.org/officeDocument/2006/relationships" xmlns:p="http://schemas.openxmlformats.org/presentationml/2006/main">
+  <p:cSld>
+    <p:spTree>
+      <p:nvGrpSpPr>
+        <p:cNvPr id="1" name=""/>
+        <p:cNvGrpSpPr/>
+        <p:nvPr/>
+      </p:nvGrpSpPr>
+      <p:grpSpPr>
+        <a:xfrm>
+          <a:off x="0" y="0"/>
+          <a:ext cx="0" cy="0"/>
+          <a:chOff x="0" y="0"/>
+          <a:chExt cx="0" cy="0"/>
+        </a:xfrm>
+      </p:grpSpPr>
+      <p:sp>
+        <p:nvSpPr>
+          <p:cNvPr id="10" name="Title 9">
+            <a:extLst>
+              <a:ext uri="{FF2B5EF4-FFF2-40B4-BE49-F238E27FC236}">
+                <a16:creationId xmlns:a16="http://schemas.microsoft.com/office/drawing/2014/main" id="{384730A8-07BC-DA1C-7A43-7FD8702C89F9}"/>
+              </a:ext>
+            </a:extLst>
+          </p:cNvPr>
+          <p:cNvSpPr>
+            <a:spLocks noGrp="1"/>
+          </p:cNvSpPr>
+          <p:nvPr>
+            <p:ph type="title"/>
+          </p:nvPr>
+        </p:nvSpPr>
+        <p:spPr>
+          <a:xfrm>
+            <a:off x="1143000" y="0"/>
+            <a:ext cx="9906000" cy="1382156"/>
+          </a:xfrm>
+        </p:spPr>
+        <p:txBody>
+          <a:bodyPr/>
+          <a:lstStyle/>
+          <a:p>
+            <a:r>
+              <a:rPr lang="en-US" dirty="0"/>
+              <a:t>Before and after Prediction</a:t>
+            </a:r>
+            <a:endParaRPr lang="en-KE" dirty="0"/>
+          </a:p>
+        </p:txBody>
+      </p:sp>
+      <p:pic>
+        <p:nvPicPr>
+          <p:cNvPr id="14" name="Content Placeholder 13" descr="A screenshot of a computer&#10;&#10;Description automatically generated">
+            <a:extLst>
+              <a:ext uri="{FF2B5EF4-FFF2-40B4-BE49-F238E27FC236}">
+                <a16:creationId xmlns:a16="http://schemas.microsoft.com/office/drawing/2014/main" id="{DAD5AD4F-02F1-9CDE-B01E-A660AA4914DE}"/>
+              </a:ext>
+            </a:extLst>
+          </p:cNvPr>
+          <p:cNvPicPr>
+            <a:picLocks noGrp="1" noChangeAspect="1"/>
+          </p:cNvPicPr>
+          <p:nvPr>
+            <p:ph sz="half" idx="1"/>
+          </p:nvPr>
+        </p:nvPicPr>
+        <p:blipFill>
+          <a:blip r:embed="rId2">
+            <a:extLst>
+              <a:ext uri="{28A0092B-C50C-407E-A947-70E740481C1C}">
+                <a14:useLocalDpi xmlns:a14="http://schemas.microsoft.com/office/drawing/2010/main" val="0"/>
+              </a:ext>
+            </a:extLst>
+          </a:blip>
+          <a:stretch>
+            <a:fillRect/>
+          </a:stretch>
+        </p:blipFill>
+        <p:spPr>
+          <a:xfrm>
+            <a:off x="0" y="925287"/>
+            <a:ext cx="6019800" cy="5932714"/>
+          </a:xfrm>
+        </p:spPr>
+      </p:pic>
+      <p:pic>
+        <p:nvPicPr>
+          <p:cNvPr id="16" name="Content Placeholder 15" descr="A screenshot of a computer&#10;&#10;Description automatically generated">
+            <a:extLst>
+              <a:ext uri="{FF2B5EF4-FFF2-40B4-BE49-F238E27FC236}">
+                <a16:creationId xmlns:a16="http://schemas.microsoft.com/office/drawing/2014/main" id="{ED238121-F85E-E112-C1A8-EF8016C725CD}"/>
+              </a:ext>
+            </a:extLst>
+          </p:cNvPr>
+          <p:cNvPicPr>
+            <a:picLocks noGrp="1" noChangeAspect="1"/>
+          </p:cNvPicPr>
+          <p:nvPr>
+            <p:ph sz="half" idx="2"/>
+          </p:nvPr>
+        </p:nvPicPr>
+        <p:blipFill>
+          <a:blip r:embed="rId3">
+            <a:extLst>
+              <a:ext uri="{28A0092B-C50C-407E-A947-70E740481C1C}">
+                <a14:useLocalDpi xmlns:a14="http://schemas.microsoft.com/office/drawing/2010/main" val="0"/>
+              </a:ext>
+            </a:extLst>
+          </a:blip>
+          <a:stretch>
+            <a:fillRect/>
+          </a:stretch>
+        </p:blipFill>
+        <p:spPr>
+          <a:xfrm>
+            <a:off x="6172200" y="925287"/>
+            <a:ext cx="6019800" cy="5932714"/>
+          </a:xfrm>
+        </p:spPr>
+      </p:pic>
+    </p:spTree>
+    <p:extLst>
+      <p:ext uri="{BB962C8B-B14F-4D97-AF65-F5344CB8AC3E}">
+        <p14:creationId xmlns:p14="http://schemas.microsoft.com/office/powerpoint/2010/main" val="2424628430"/>
       </p:ext>
     </p:extLst>
   </p:cSld>

</xml_diff>